<commit_message>
add magictrick I&II.pptx, incexc I&II.pptx
</commit_message>
<xml_diff>
--- a/spring13/slides13/inc-exc.pptx
+++ b/spring13/slides13/inc-exc.pptx
@@ -2675,12 +2675,12 @@
               <a:defRPr/>
             </a:pPr>
             <a:r>
-              <a:rPr lang="en-US" dirty="0" err="1"/>
-              <a:t>lec</a:t>
+              <a:rPr lang="en-US" dirty="0" err="1" smtClean="0"/>
+              <a:t>incexcI</a:t>
             </a:r>
             <a:r>
               <a:rPr lang="en-US" dirty="0" smtClean="0"/>
-              <a:t> 10F.</a:t>
+              <a:t>.</a:t>
             </a:r>
             <a:fld id="{CB2BD928-FA73-41E2-BD29-ED16D1EFD71C}" type="slidenum">
               <a:rPr lang="en-US" smtClean="0"/>
@@ -2698,6 +2698,9 @@
   <p:clrMapOvr>
     <a:masterClrMapping/>
   </p:clrMapOvr>
+  <p:transition xmlns:p14="http://schemas.microsoft.com/office/powerpoint/2010/main" spd="slow" advClick="0">
+    <p:fade/>
+  </p:transition>
   <p:timing>
     <p:tnLst>
       <p:par>
@@ -2825,12 +2828,12 @@
               <a:defRPr/>
             </a:pPr>
             <a:r>
-              <a:rPr lang="en-US" dirty="0" err="1"/>
-              <a:t>lec</a:t>
+              <a:rPr lang="en-US" dirty="0" err="1" smtClean="0"/>
+              <a:t>incexcI</a:t>
             </a:r>
             <a:r>
               <a:rPr lang="en-US" dirty="0" smtClean="0"/>
-              <a:t> 10F.</a:t>
+              <a:t>.</a:t>
             </a:r>
             <a:fld id="{D64AE0B5-FBC8-401C-9D58-7FCB6A8BDAB7}" type="slidenum">
               <a:rPr lang="en-US" smtClean="0"/>
@@ -2848,6 +2851,9 @@
   <p:clrMapOvr>
     <a:masterClrMapping/>
   </p:clrMapOvr>
+  <p:transition xmlns:p14="http://schemas.microsoft.com/office/powerpoint/2010/main" spd="slow" advClick="0">
+    <p:fade/>
+  </p:transition>
   <p:timing>
     <p:tnLst>
       <p:par>
@@ -2923,12 +2929,12 @@
               <a:defRPr/>
             </a:pPr>
             <a:r>
-              <a:rPr lang="en-US" dirty="0" err="1"/>
-              <a:t>lec</a:t>
+              <a:rPr lang="en-US" dirty="0" err="1" smtClean="0"/>
+              <a:t>incexcI</a:t>
             </a:r>
             <a:r>
               <a:rPr lang="en-US" dirty="0" smtClean="0"/>
-              <a:t> 10F.</a:t>
+              <a:t>.</a:t>
             </a:r>
             <a:fld id="{2B54D3A3-7076-4E41-BC8B-85C6A2A80614}" type="slidenum">
               <a:rPr lang="en-US" smtClean="0"/>
@@ -2946,6 +2952,9 @@
   <p:clrMapOvr>
     <a:masterClrMapping/>
   </p:clrMapOvr>
+  <p:transition xmlns:p14="http://schemas.microsoft.com/office/powerpoint/2010/main" spd="slow" advClick="0">
+    <p:fade/>
+  </p:transition>
   <p:timing>
     <p:tnLst>
       <p:par>
@@ -3001,12 +3010,12 @@
               <a:defRPr/>
             </a:pPr>
             <a:r>
-              <a:rPr lang="en-US" dirty="0" err="1"/>
-              <a:t>lec</a:t>
+              <a:rPr lang="en-US" dirty="0" err="1" smtClean="0"/>
+              <a:t>incexcI</a:t>
             </a:r>
             <a:r>
               <a:rPr lang="en-US" dirty="0" smtClean="0"/>
-              <a:t> 10F.</a:t>
+              <a:t>.</a:t>
             </a:r>
             <a:fld id="{9515C841-0140-49CE-8F2C-6959C7D70FD7}" type="slidenum">
               <a:rPr lang="en-US" smtClean="0"/>
@@ -3024,6 +3033,9 @@
   <p:clrMapOvr>
     <a:masterClrMapping/>
   </p:clrMapOvr>
+  <p:transition xmlns:p14="http://schemas.microsoft.com/office/powerpoint/2010/main" spd="slow" advClick="0">
+    <p:fade/>
+  </p:transition>
   <p:timing>
     <p:tnLst>
       <p:par>
@@ -3250,11 +3262,11 @@
             </a:pPr>
             <a:r>
               <a:rPr lang="en-US" dirty="0" err="1" smtClean="0"/>
-              <a:t>lec</a:t>
+              <a:t>incexcI</a:t>
             </a:r>
             <a:r>
               <a:rPr lang="en-US" dirty="0" smtClean="0"/>
-              <a:t> 10F.</a:t>
+              <a:t>.</a:t>
             </a:r>
             <a:fld id="{079D37AF-99FA-4D01-9518-1979F7715D44}" type="slidenum">
               <a:rPr lang="en-US" smtClean="0"/>
@@ -3318,7 +3330,22 @@
                 <a:uFillTx/>
                 <a:latin typeface="Comic Sans MS" pitchFamily="66" charset="0"/>
               </a:rPr>
-              <a:t>Albert R Meyer,          April 20, 2012</a:t>
+              <a:t>Albert R Meyer,          April </a:t>
+            </a:r>
+            <a:r>
+              <a:rPr kumimoji="0" lang="en-US" sz="1200" b="0" i="0" u="none" strike="noStrike" kern="1200" cap="none" spc="0" normalizeH="0" baseline="0" noProof="0" dirty="0" smtClean="0">
+                <a:ln>
+                  <a:noFill/>
+                </a:ln>
+                <a:solidFill>
+                  <a:schemeClr val="tx1"/>
+                </a:solidFill>
+                <a:effectLst/>
+                <a:uLnTx/>
+                <a:uFillTx/>
+                <a:latin typeface="Comic Sans MS" pitchFamily="66" charset="0"/>
+              </a:rPr>
+              <a:t>24, 2013</a:t>
             </a:r>
             <a:endParaRPr kumimoji="0" lang="en-US" sz="1200" b="0" i="0" u="none" strike="noStrike" kern="1200" cap="none" spc="0" normalizeH="0" baseline="0" noProof="0" dirty="0">
               <a:ln>
@@ -3368,6 +3395,9 @@
     <p:sldLayoutId id="2147483690" r:id="rId3"/>
     <p:sldLayoutId id="2147483695" r:id="rId4"/>
   </p:sldLayoutIdLst>
+  <p:transition xmlns:p14="http://schemas.microsoft.com/office/powerpoint/2010/main" spd="slow" advClick="0">
+    <p:fade/>
+  </p:transition>
   <p:timing>
     <p:tnLst>
       <p:par>
@@ -3927,11 +3957,11 @@
           <a:p>
             <a:r>
               <a:rPr lang="en-US" dirty="0" err="1" smtClean="0"/>
-              <a:t>lec</a:t>
+              <a:t>incexcI</a:t>
             </a:r>
             <a:r>
               <a:rPr lang="en-US" dirty="0" smtClean="0"/>
-              <a:t> 10F.</a:t>
+              <a:t>.</a:t>
             </a:r>
             <a:fld id="{73B57819-3F53-4064-ABEE-665935E0A2F0}" type="slidenum">
               <a:rPr lang="en-US" smtClean="0"/>
@@ -3947,6 +3977,14 @@
   <p:clrMapOvr>
     <a:masterClrMapping/>
   </p:clrMapOvr>
+  <mc:AlternateContent xmlns:mc="http://schemas.openxmlformats.org/markup-compatibility/2006">
+    <mc:Choice xmlns:p14="http://schemas.microsoft.com/office/powerpoint/2010/main" Requires="p14">
+      <p:transition p14:dur="0" advClick="0"/>
+    </mc:Choice>
+    <mc:Fallback>
+      <p:transition xmlns:p14="http://schemas.microsoft.com/office/powerpoint/2010/main" advClick="0"/>
+    </mc:Fallback>
+  </mc:AlternateContent>
   <p:timing>
     <p:tnLst>
       <p:par>
@@ -3993,11 +4031,11 @@
           <a:p>
             <a:r>
               <a:rPr lang="en-US" dirty="0" err="1" smtClean="0"/>
-              <a:t>lec</a:t>
+              <a:t>incexcI</a:t>
             </a:r>
             <a:r>
               <a:rPr lang="en-US" dirty="0" smtClean="0"/>
-              <a:t> 10F.</a:t>
+              <a:t>.</a:t>
             </a:r>
             <a:fld id="{83D78B86-54BD-4C40-B154-E0B4BEB7EE49}" type="slidenum">
               <a:rPr lang="en-US" smtClean="0"/>
@@ -4047,8 +4085,8 @@
         </p:nvSpPr>
         <p:spPr>
           <a:xfrm>
-            <a:off x="457200" y="1295400"/>
-            <a:ext cx="8229600" cy="4339650"/>
+            <a:off x="304800" y="1375350"/>
+            <a:ext cx="8458200" cy="5262979"/>
           </a:xfrm>
           <a:prstGeom prst="rect">
             <a:avLst/>
@@ -4129,9 +4167,41 @@
               <a:rPr lang="en-US" sz="6000" dirty="0" smtClean="0">
                 <a:latin typeface="Comic Sans MS" pitchFamily="66" charset="0"/>
               </a:rPr>
-              <a:t>counting:</a:t>
+              <a:t>counting</a:t>
+            </a:r>
+          </a:p>
+          <a:p>
+            <a:r>
+              <a:rPr lang="en-US" sz="6000" smtClean="0">
+                <a:solidFill>
+                  <a:srgbClr val="90096D"/>
+                </a:solidFill>
+                <a:latin typeface="Comic Sans MS" pitchFamily="66" charset="0"/>
+              </a:rPr>
+              <a:t>              -</a:t>
+            </a:r>
+            <a:r>
+              <a:rPr lang="en-US" sz="6000" dirty="0" smtClean="0">
+                <a:solidFill>
+                  <a:srgbClr val="90096D"/>
+                </a:solidFill>
+                <a:latin typeface="Comic Sans MS" pitchFamily="66" charset="0"/>
+              </a:rPr>
+              <a:t>-</a:t>
+            </a:r>
+            <a:r>
+              <a:rPr lang="en-US" sz="6000" dirty="0" smtClean="0">
+                <a:solidFill>
+                  <a:srgbClr val="90096D"/>
+                </a:solidFill>
+                <a:latin typeface="Comic Sans MS" pitchFamily="66" charset="0"/>
+              </a:rPr>
+              <a:t>next</a:t>
             </a:r>
             <a:endParaRPr lang="en-US" sz="6000" dirty="0" smtClean="0">
+              <a:solidFill>
+                <a:srgbClr val="90096D"/>
+              </a:solidFill>
               <a:latin typeface="Comic Sans MS" pitchFamily="66" charset="0"/>
             </a:endParaRPr>
           </a:p>
@@ -4142,8 +4212,8 @@
   <p:clrMapOvr>
     <a:masterClrMapping/>
   </p:clrMapOvr>
-  <p:transition xmlns:p14="http://schemas.microsoft.com/office/powerpoint/2010/main" spd="slow">
-    <p:fade thruBlk="1"/>
+  <p:transition xmlns:p14="http://schemas.microsoft.com/office/powerpoint/2010/main" spd="slow" advClick="0">
+    <p:fade/>
   </p:transition>
   <p:timing>
     <p:tnLst>
@@ -4458,6 +4528,67 @@
                       </p:childTnLst>
                     </p:cTn>
                   </p:par>
+                  <p:par>
+                    <p:cTn id="28" fill="hold">
+                      <p:stCondLst>
+                        <p:cond delay="indefinite"/>
+                      </p:stCondLst>
+                      <p:childTnLst>
+                        <p:par>
+                          <p:cTn id="29" fill="hold">
+                            <p:stCondLst>
+                              <p:cond delay="0"/>
+                            </p:stCondLst>
+                            <p:childTnLst>
+                              <p:par>
+                                <p:cTn id="30" presetID="10" presetClass="entr" presetSubtype="0" fill="hold" nodeType="clickEffect">
+                                  <p:stCondLst>
+                                    <p:cond delay="0"/>
+                                  </p:stCondLst>
+                                  <p:childTnLst>
+                                    <p:set>
+                                      <p:cBhvr>
+                                        <p:cTn id="31" dur="1" fill="hold">
+                                          <p:stCondLst>
+                                            <p:cond delay="0"/>
+                                          </p:stCondLst>
+                                        </p:cTn>
+                                        <p:tgtEl>
+                                          <p:spTgt spid="2">
+                                            <p:txEl>
+                                              <p:pRg st="5" end="5"/>
+                                            </p:txEl>
+                                          </p:spTgt>
+                                        </p:tgtEl>
+                                        <p:attrNameLst>
+                                          <p:attrName>style.visibility</p:attrName>
+                                        </p:attrNameLst>
+                                      </p:cBhvr>
+                                      <p:to>
+                                        <p:strVal val="visible"/>
+                                      </p:to>
+                                    </p:set>
+                                    <p:animEffect transition="in" filter="fade">
+                                      <p:cBhvr>
+                                        <p:cTn id="32" dur="500"/>
+                                        <p:tgtEl>
+                                          <p:spTgt spid="2">
+                                            <p:txEl>
+                                              <p:pRg st="5" end="5"/>
+                                            </p:txEl>
+                                          </p:spTgt>
+                                        </p:tgtEl>
+                                      </p:cBhvr>
+                                    </p:animEffect>
+                                  </p:childTnLst>
+                                </p:cTn>
+                              </p:par>
+                            </p:childTnLst>
+                          </p:cTn>
+                        </p:par>
+                      </p:childTnLst>
+                    </p:cTn>
+                  </p:par>
                 </p:childTnLst>
               </p:cTn>
               <p:prevCondLst>
@@ -4519,11 +4650,11 @@
           <a:p>
             <a:r>
               <a:rPr lang="en-US" dirty="0" err="1" smtClean="0"/>
-              <a:t>lec</a:t>
+              <a:t>incexcI</a:t>
             </a:r>
             <a:r>
               <a:rPr lang="en-US" dirty="0" smtClean="0"/>
-              <a:t> 10F.</a:t>
+              <a:t>.</a:t>
             </a:r>
             <a:fld id="{83D78B86-54BD-4C40-B154-E0B4BEB7EE49}" type="slidenum">
               <a:rPr lang="en-US" smtClean="0"/>
@@ -4592,7 +4723,7 @@
           <a:graphicData uri="http://schemas.openxmlformats.org/presentationml/2006/ole">
             <mc:AlternateContent xmlns:mc="http://schemas.openxmlformats.org/markup-compatibility/2006">
               <mc:Choice xmlns:v="urn:schemas-microsoft-com:vml" Requires="v">
-                <p:oleObj spid="_x0000_s202774" name="Equation" r:id="rId4" imgW="2159000" imgH="533400" progId="Equation.3">
+                <p:oleObj spid="_x0000_s202781" name="Equation" r:id="rId4" imgW="2159000" imgH="533400" progId="Equation.3">
                   <p:embed/>
                 </p:oleObj>
               </mc:Choice>
@@ -4649,7 +4780,7 @@
           <a:graphicData uri="http://schemas.openxmlformats.org/presentationml/2006/ole">
             <mc:AlternateContent xmlns:mc="http://schemas.openxmlformats.org/markup-compatibility/2006">
               <mc:Choice xmlns:v="urn:schemas-microsoft-com:vml" Requires="v">
-                <p:oleObj spid="_x0000_s202775" name="Equation" r:id="rId6" imgW="2552700" imgH="533400" progId="Equation.DSMT4">
+                <p:oleObj spid="_x0000_s202782" name="Equation" r:id="rId6" imgW="2552700" imgH="533400" progId="Equation.DSMT4">
                   <p:embed/>
                 </p:oleObj>
               </mc:Choice>
@@ -4694,8 +4825,8 @@
   <p:clrMapOvr>
     <a:masterClrMapping/>
   </p:clrMapOvr>
-  <p:transition xmlns:p14="http://schemas.microsoft.com/office/powerpoint/2010/main" spd="slow">
-    <p:fade thruBlk="1"/>
+  <p:transition xmlns:p14="http://schemas.microsoft.com/office/powerpoint/2010/main" spd="slow" advClick="0">
+    <p:fade/>
   </p:transition>
   <p:timing>
     <p:tnLst>
@@ -4743,11 +4874,11 @@
           <a:p>
             <a:r>
               <a:rPr lang="en-US" dirty="0" err="1" smtClean="0"/>
-              <a:t>lec</a:t>
+              <a:t>incexcI</a:t>
             </a:r>
             <a:r>
               <a:rPr lang="en-US" dirty="0" smtClean="0"/>
-              <a:t> 10F.</a:t>
+              <a:t>.</a:t>
             </a:r>
             <a:fld id="{83D78B86-54BD-4C40-B154-E0B4BEB7EE49}" type="slidenum">
               <a:rPr lang="en-US" smtClean="0"/>
@@ -4816,7 +4947,7 @@
           <a:graphicData uri="http://schemas.openxmlformats.org/presentationml/2006/ole">
             <mc:AlternateContent xmlns:mc="http://schemas.openxmlformats.org/markup-compatibility/2006">
               <mc:Choice xmlns:v="urn:schemas-microsoft-com:vml" Requires="v">
-                <p:oleObj spid="_x0000_s203804" name="Equation" r:id="rId4" imgW="1092200" imgH="533400" progId="Equation.DSMT4">
+                <p:oleObj spid="_x0000_s203811" name="Equation" r:id="rId4" imgW="1092200" imgH="533400" progId="Equation.DSMT4">
                   <p:embed/>
                 </p:oleObj>
               </mc:Choice>
@@ -4873,7 +5004,7 @@
           <a:graphicData uri="http://schemas.openxmlformats.org/presentationml/2006/ole">
             <mc:AlternateContent xmlns:mc="http://schemas.openxmlformats.org/markup-compatibility/2006">
               <mc:Choice xmlns:v="urn:schemas-microsoft-com:vml" Requires="v">
-                <p:oleObj spid="_x0000_s203805" name="Equation" r:id="rId6" imgW="1181100" imgH="533400" progId="Equation.DSMT4">
+                <p:oleObj spid="_x0000_s203812" name="Equation" r:id="rId6" imgW="1181100" imgH="533400" progId="Equation.DSMT4">
                   <p:embed/>
                 </p:oleObj>
               </mc:Choice>
@@ -4918,8 +5049,8 @@
   <p:clrMapOvr>
     <a:masterClrMapping/>
   </p:clrMapOvr>
-  <p:transition xmlns:p14="http://schemas.microsoft.com/office/powerpoint/2010/main" spd="slow">
-    <p:fade thruBlk="1"/>
+  <p:transition xmlns:p14="http://schemas.microsoft.com/office/powerpoint/2010/main" spd="slow" advClick="0">
+    <p:fade/>
   </p:transition>
   <p:timing>
     <p:tnLst>
@@ -5099,11 +5230,11 @@
           <a:p>
             <a:r>
               <a:rPr lang="en-US" dirty="0" err="1" smtClean="0"/>
-              <a:t>lec</a:t>
+              <a:t>incexcI</a:t>
             </a:r>
             <a:r>
               <a:rPr lang="en-US" dirty="0" smtClean="0"/>
-              <a:t> 10F.</a:t>
+              <a:t>.</a:t>
             </a:r>
             <a:fld id="{83D78B86-54BD-4C40-B154-E0B4BEB7EE49}" type="slidenum">
               <a:rPr lang="en-US" smtClean="0"/>
@@ -5218,7 +5349,7 @@
           <a:graphicData uri="http://schemas.openxmlformats.org/presentationml/2006/ole">
             <mc:AlternateContent xmlns:mc="http://schemas.openxmlformats.org/markup-compatibility/2006">
               <mc:Choice xmlns:v="urn:schemas-microsoft-com:vml" Requires="v">
-                <p:oleObj spid="_x0000_s204818" name="Equation" r:id="rId4" imgW="2070100" imgH="584200" progId="Equation.DSMT4">
+                <p:oleObj spid="_x0000_s204822" name="Equation" r:id="rId4" imgW="2070100" imgH="584200" progId="Equation.DSMT4">
                   <p:embed/>
                 </p:oleObj>
               </mc:Choice>
@@ -5263,8 +5394,8 @@
   <p:clrMapOvr>
     <a:masterClrMapping/>
   </p:clrMapOvr>
-  <p:transition xmlns:p14="http://schemas.microsoft.com/office/powerpoint/2010/main" spd="slow">
-    <p:fade thruBlk="1"/>
+  <p:transition xmlns:p14="http://schemas.microsoft.com/office/powerpoint/2010/main" spd="slow" advClick="0">
+    <p:fade/>
   </p:transition>
   <p:timing>
     <p:tnLst>
@@ -5312,11 +5443,11 @@
           <a:p>
             <a:r>
               <a:rPr lang="en-US" dirty="0" err="1" smtClean="0"/>
-              <a:t>lec</a:t>
+              <a:t>incexcI</a:t>
             </a:r>
             <a:r>
               <a:rPr lang="en-US" dirty="0" smtClean="0"/>
-              <a:t> 10F.</a:t>
+              <a:t>.</a:t>
             </a:r>
             <a:fld id="{83D78B86-54BD-4C40-B154-E0B4BEB7EE49}" type="slidenum">
               <a:rPr lang="en-US" smtClean="0"/>
@@ -5431,7 +5562,7 @@
           <a:graphicData uri="http://schemas.openxmlformats.org/presentationml/2006/ole">
             <mc:AlternateContent xmlns:mc="http://schemas.openxmlformats.org/markup-compatibility/2006">
               <mc:Choice xmlns:v="urn:schemas-microsoft-com:vml" Requires="v">
-                <p:oleObj spid="_x0000_s206860" name="Equation" r:id="rId4" imgW="2336800" imgH="533400" progId="Equation.DSMT4">
+                <p:oleObj spid="_x0000_s206864" name="Equation" r:id="rId4" imgW="2336800" imgH="533400" progId="Equation.DSMT4">
                   <p:embed/>
                 </p:oleObj>
               </mc:Choice>
@@ -5476,8 +5607,8 @@
   <p:clrMapOvr>
     <a:masterClrMapping/>
   </p:clrMapOvr>
-  <p:transition xmlns:p14="http://schemas.microsoft.com/office/powerpoint/2010/main" spd="slow">
-    <p:fade thruBlk="1"/>
+  <p:transition xmlns:p14="http://schemas.microsoft.com/office/powerpoint/2010/main" spd="slow" advClick="0">
+    <p:fade/>
   </p:transition>
   <p:timing>
     <p:tnLst>
@@ -5525,11 +5656,11 @@
           <a:p>
             <a:r>
               <a:rPr lang="en-US" dirty="0" err="1" smtClean="0"/>
-              <a:t>lec</a:t>
+              <a:t>incexcI</a:t>
             </a:r>
             <a:r>
               <a:rPr lang="en-US" dirty="0" smtClean="0"/>
-              <a:t> 10F.</a:t>
+              <a:t>.</a:t>
             </a:r>
             <a:fld id="{83D78B86-54BD-4C40-B154-E0B4BEB7EE49}" type="slidenum">
               <a:rPr lang="en-US" smtClean="0"/>
@@ -5729,7 +5860,7 @@
           <a:graphicData uri="http://schemas.openxmlformats.org/presentationml/2006/ole">
             <mc:AlternateContent xmlns:mc="http://schemas.openxmlformats.org/markup-compatibility/2006">
               <mc:Choice xmlns:v="urn:schemas-microsoft-com:vml" Requires="v">
-                <p:oleObj spid="_x0000_s205869" name="Equation" r:id="rId4" imgW="139700" imgH="215900" progId="Equation.DSMT4">
+                <p:oleObj spid="_x0000_s205879" name="Equation" r:id="rId4" imgW="139700" imgH="215900" progId="Equation.DSMT4">
                   <p:embed/>
                 </p:oleObj>
               </mc:Choice>
@@ -5786,7 +5917,7 @@
           <a:graphicData uri="http://schemas.openxmlformats.org/presentationml/2006/ole">
             <mc:AlternateContent xmlns:mc="http://schemas.openxmlformats.org/markup-compatibility/2006">
               <mc:Choice xmlns:v="urn:schemas-microsoft-com:vml" Requires="v">
-                <p:oleObj spid="_x0000_s205870" name="Equation" r:id="rId6" imgW="139700" imgH="215900" progId="Equation.DSMT4">
+                <p:oleObj spid="_x0000_s205880" name="Equation" r:id="rId6" imgW="139700" imgH="215900" progId="Equation.DSMT4">
                   <p:embed/>
                 </p:oleObj>
               </mc:Choice>
@@ -5843,7 +5974,7 @@
           <a:graphicData uri="http://schemas.openxmlformats.org/presentationml/2006/ole">
             <mc:AlternateContent xmlns:mc="http://schemas.openxmlformats.org/markup-compatibility/2006">
               <mc:Choice xmlns:v="urn:schemas-microsoft-com:vml" Requires="v">
-                <p:oleObj spid="_x0000_s205871" name="Equation" r:id="rId7" imgW="1574800" imgH="533400" progId="Equation.DSMT4">
+                <p:oleObj spid="_x0000_s205881" name="Equation" r:id="rId7" imgW="1574800" imgH="533400" progId="Equation.DSMT4">
                   <p:embed/>
                 </p:oleObj>
               </mc:Choice>
@@ -5888,8 +6019,8 @@
   <p:clrMapOvr>
     <a:masterClrMapping/>
   </p:clrMapOvr>
-  <p:transition xmlns:p14="http://schemas.microsoft.com/office/powerpoint/2010/main" spd="slow">
-    <p:fade thruBlk="1"/>
+  <p:transition xmlns:p14="http://schemas.microsoft.com/office/powerpoint/2010/main" spd="slow" advClick="0">
+    <p:fade/>
   </p:transition>
   <p:timing>
     <p:tnLst>
@@ -5937,11 +6068,11 @@
           <a:p>
             <a:r>
               <a:rPr lang="en-US" dirty="0" err="1" smtClean="0"/>
-              <a:t>lec</a:t>
+              <a:t>incexcI</a:t>
             </a:r>
             <a:r>
               <a:rPr lang="en-US" dirty="0" smtClean="0"/>
-              <a:t> 10F.</a:t>
+              <a:t>.</a:t>
             </a:r>
             <a:fld id="{83D78B86-54BD-4C40-B154-E0B4BEB7EE49}" type="slidenum">
               <a:rPr lang="en-US" smtClean="0"/>
@@ -6141,7 +6272,7 @@
           <a:graphicData uri="http://schemas.openxmlformats.org/presentationml/2006/ole">
             <mc:AlternateContent xmlns:mc="http://schemas.openxmlformats.org/markup-compatibility/2006">
               <mc:Choice xmlns:v="urn:schemas-microsoft-com:vml" Requires="v">
-                <p:oleObj spid="_x0000_s207918" name="Equation" r:id="rId4" imgW="139700" imgH="215900" progId="Equation.DSMT4">
+                <p:oleObj spid="_x0000_s207931" name="Equation" r:id="rId4" imgW="139700" imgH="215900" progId="Equation.DSMT4">
                   <p:embed/>
                 </p:oleObj>
               </mc:Choice>
@@ -6198,7 +6329,7 @@
           <a:graphicData uri="http://schemas.openxmlformats.org/presentationml/2006/ole">
             <mc:AlternateContent xmlns:mc="http://schemas.openxmlformats.org/markup-compatibility/2006">
               <mc:Choice xmlns:v="urn:schemas-microsoft-com:vml" Requires="v">
-                <p:oleObj spid="_x0000_s207919" name="Equation" r:id="rId6" imgW="139700" imgH="215900" progId="Equation.DSMT4">
+                <p:oleObj spid="_x0000_s207932" name="Equation" r:id="rId6" imgW="139700" imgH="215900" progId="Equation.DSMT4">
                   <p:embed/>
                 </p:oleObj>
               </mc:Choice>
@@ -6255,7 +6386,7 @@
           <a:graphicData uri="http://schemas.openxmlformats.org/presentationml/2006/ole">
             <mc:AlternateContent xmlns:mc="http://schemas.openxmlformats.org/markup-compatibility/2006">
               <mc:Choice xmlns:v="urn:schemas-microsoft-com:vml" Requires="v">
-                <p:oleObj spid="_x0000_s207920" name="Equation" r:id="rId7" imgW="1765300" imgH="533400" progId="Equation.DSMT4">
+                <p:oleObj spid="_x0000_s207933" name="Equation" r:id="rId7" imgW="1765300" imgH="533400" progId="Equation.DSMT4">
                   <p:embed/>
                 </p:oleObj>
               </mc:Choice>
@@ -6312,7 +6443,7 @@
           <a:graphicData uri="http://schemas.openxmlformats.org/presentationml/2006/ole">
             <mc:AlternateContent xmlns:mc="http://schemas.openxmlformats.org/markup-compatibility/2006">
               <mc:Choice xmlns:v="urn:schemas-microsoft-com:vml" Requires="v">
-                <p:oleObj spid="_x0000_s207921" name="Equation" r:id="rId9" imgW="1397000" imgH="533400" progId="Equation.DSMT4">
+                <p:oleObj spid="_x0000_s207934" name="Equation" r:id="rId9" imgW="1397000" imgH="533400" progId="Equation.DSMT4">
                   <p:embed/>
                 </p:oleObj>
               </mc:Choice>
@@ -6357,18 +6488,9 @@
   <p:clrMapOvr>
     <a:masterClrMapping/>
   </p:clrMapOvr>
-  <mc:AlternateContent xmlns:mc="http://schemas.openxmlformats.org/markup-compatibility/2006" xmlns:p14="http://schemas.microsoft.com/office/powerpoint/2010/main">
-    <mc:Choice Requires="p14">
-      <p:transition spd="med" p14:dur="700">
-        <p:fade/>
-      </p:transition>
-    </mc:Choice>
-    <mc:Fallback xmlns="">
-      <p:transition xmlns:p14="http://schemas.microsoft.com/office/powerpoint/2010/main" spd="med">
-        <p:fade/>
-      </p:transition>
-    </mc:Fallback>
-  </mc:AlternateContent>
+  <p:transition xmlns:p14="http://schemas.microsoft.com/office/powerpoint/2010/main" spd="slow" advClick="0">
+    <p:fade/>
+  </p:transition>
   <p:timing>
     <p:tnLst>
       <p:par>
@@ -6491,11 +6613,11 @@
           <a:p>
             <a:r>
               <a:rPr lang="en-US" dirty="0" err="1" smtClean="0"/>
-              <a:t>lec</a:t>
+              <a:t>incexcI</a:t>
             </a:r>
             <a:r>
               <a:rPr lang="en-US" dirty="0" smtClean="0"/>
-              <a:t> 10F.</a:t>
+              <a:t>.</a:t>
             </a:r>
             <a:fld id="{440333D2-3154-4D4B-AAB9-AB5679BA8A30}" type="slidenum">
               <a:rPr lang="en-US" smtClean="0"/>
@@ -6528,7 +6650,7 @@
           <a:graphicData uri="http://schemas.openxmlformats.org/presentationml/2006/ole">
             <mc:AlternateContent xmlns:mc="http://schemas.openxmlformats.org/markup-compatibility/2006">
               <mc:Choice xmlns:v="urn:schemas-microsoft-com:vml" Requires="v">
-                <p:oleObj spid="_x0000_s209944" name="Equation" r:id="rId4" imgW="2133600" imgH="533400" progId="Equation.DSMT4">
+                <p:oleObj spid="_x0000_s209954" name="Equation" r:id="rId4" imgW="2133600" imgH="533400" progId="Equation.DSMT4">
                   <p:embed/>
                 </p:oleObj>
               </mc:Choice>
@@ -6585,7 +6707,7 @@
           <a:graphicData uri="http://schemas.openxmlformats.org/presentationml/2006/ole">
             <mc:AlternateContent xmlns:mc="http://schemas.openxmlformats.org/markup-compatibility/2006">
               <mc:Choice xmlns:v="urn:schemas-microsoft-com:vml" Requires="v">
-                <p:oleObj spid="_x0000_s209945" name="Equation" r:id="rId6" imgW="1397000" imgH="241300" progId="Equation.DSMT4">
+                <p:oleObj spid="_x0000_s209955" name="Equation" r:id="rId6" imgW="1397000" imgH="241300" progId="Equation.DSMT4">
                   <p:embed/>
                 </p:oleObj>
               </mc:Choice>
@@ -6701,7 +6823,7 @@
           <a:graphicData uri="http://schemas.openxmlformats.org/presentationml/2006/ole">
             <mc:AlternateContent xmlns:mc="http://schemas.openxmlformats.org/markup-compatibility/2006">
               <mc:Choice xmlns:v="urn:schemas-microsoft-com:vml" Requires="v">
-                <p:oleObj spid="_x0000_s209946" name="Equation" r:id="rId8" imgW="1549400" imgH="266700" progId="Equation.DSMT4">
+                <p:oleObj spid="_x0000_s209956" name="Equation" r:id="rId8" imgW="1549400" imgH="266700" progId="Equation.DSMT4">
                   <p:embed/>
                 </p:oleObj>
               </mc:Choice>
@@ -6782,18 +6904,9 @@
   <p:clrMapOvr>
     <a:masterClrMapping/>
   </p:clrMapOvr>
-  <mc:AlternateContent xmlns:mc="http://schemas.openxmlformats.org/markup-compatibility/2006" xmlns:p14="http://schemas.microsoft.com/office/powerpoint/2010/main">
-    <mc:Choice Requires="p14">
-      <p:transition spd="med" p14:dur="700">
-        <p:fade/>
-      </p:transition>
-    </mc:Choice>
-    <mc:Fallback xmlns="">
-      <p:transition xmlns:p14="http://schemas.microsoft.com/office/powerpoint/2010/main" spd="med">
-        <p:fade/>
-      </p:transition>
-    </mc:Fallback>
-  </mc:AlternateContent>
+  <p:transition xmlns:p14="http://schemas.microsoft.com/office/powerpoint/2010/main" spd="slow" advClick="0">
+    <p:fade/>
+  </p:transition>
   <p:timing>
     <p:tnLst>
       <p:par>
@@ -6969,11 +7082,11 @@
           <a:p>
             <a:r>
               <a:rPr lang="en-US" dirty="0" err="1" smtClean="0"/>
-              <a:t>lec</a:t>
+              <a:t>incexcI</a:t>
             </a:r>
             <a:r>
               <a:rPr lang="en-US" dirty="0" smtClean="0"/>
-              <a:t> 10F.</a:t>
+              <a:t>.</a:t>
             </a:r>
             <a:fld id="{440333D2-3154-4D4B-AAB9-AB5679BA8A30}" type="slidenum">
               <a:rPr lang="en-US" smtClean="0"/>
@@ -7006,7 +7119,7 @@
           <a:graphicData uri="http://schemas.openxmlformats.org/presentationml/2006/ole">
             <mc:AlternateContent xmlns:mc="http://schemas.openxmlformats.org/markup-compatibility/2006">
               <mc:Choice xmlns:v="urn:schemas-microsoft-com:vml" Requires="v">
-                <p:oleObj spid="_x0000_s210968" name="Equation" r:id="rId4" imgW="2133600" imgH="533400" progId="Equation.DSMT4">
+                <p:oleObj spid="_x0000_s210978" name="Equation" r:id="rId4" imgW="2133600" imgH="533400" progId="Equation.DSMT4">
                   <p:embed/>
                 </p:oleObj>
               </mc:Choice>
@@ -7063,7 +7176,7 @@
           <a:graphicData uri="http://schemas.openxmlformats.org/presentationml/2006/ole">
             <mc:AlternateContent xmlns:mc="http://schemas.openxmlformats.org/markup-compatibility/2006">
               <mc:Choice xmlns:v="urn:schemas-microsoft-com:vml" Requires="v">
-                <p:oleObj spid="_x0000_s210969" name="Equation" r:id="rId6" imgW="1397000" imgH="241300" progId="Equation.DSMT4">
+                <p:oleObj spid="_x0000_s210979" name="Equation" r:id="rId6" imgW="1397000" imgH="241300" progId="Equation.DSMT4">
                   <p:embed/>
                 </p:oleObj>
               </mc:Choice>
@@ -7179,7 +7292,7 @@
           <a:graphicData uri="http://schemas.openxmlformats.org/presentationml/2006/ole">
             <mc:AlternateContent xmlns:mc="http://schemas.openxmlformats.org/markup-compatibility/2006">
               <mc:Choice xmlns:v="urn:schemas-microsoft-com:vml" Requires="v">
-                <p:oleObj spid="_x0000_s210970" name="Equation" r:id="rId8" imgW="1549400" imgH="266700" progId="Equation.DSMT4">
+                <p:oleObj spid="_x0000_s210980" name="Equation" r:id="rId8" imgW="1549400" imgH="266700" progId="Equation.DSMT4">
                   <p:embed/>
                 </p:oleObj>
               </mc:Choice>
@@ -7294,14 +7407,9 @@
   <p:clrMapOvr>
     <a:masterClrMapping/>
   </p:clrMapOvr>
-  <mc:AlternateContent xmlns:mc="http://schemas.openxmlformats.org/markup-compatibility/2006" xmlns:p14="http://schemas.microsoft.com/office/powerpoint/2010/main">
-    <mc:Choice Requires="p14">
-      <p:transition p14:dur="0"/>
-    </mc:Choice>
-    <mc:Fallback xmlns="">
-      <p:transition xmlns:p14="http://schemas.microsoft.com/office/powerpoint/2010/main"/>
-    </mc:Fallback>
-  </mc:AlternateContent>
+  <p:transition xmlns:p14="http://schemas.microsoft.com/office/powerpoint/2010/main" spd="slow" advClick="0">
+    <p:fade/>
+  </p:transition>
   <p:timing>
     <p:tnLst>
       <p:par>
@@ -7810,11 +7918,11 @@
           <a:p>
             <a:r>
               <a:rPr lang="en-US" dirty="0" err="1" smtClean="0"/>
-              <a:t>lec</a:t>
+              <a:t>incexcI</a:t>
             </a:r>
             <a:r>
               <a:rPr lang="en-US" dirty="0" smtClean="0"/>
-              <a:t> 10F.</a:t>
+              <a:t>.</a:t>
             </a:r>
             <a:fld id="{AF7E73BC-8DF8-480C-A2A6-EE1684FF3787}" type="slidenum">
               <a:rPr lang="en-US" smtClean="0"/>
@@ -7830,7 +7938,7 @@
   <p:clrMapOvr>
     <a:masterClrMapping/>
   </p:clrMapOvr>
-  <p:transition xmlns:p14="http://schemas.microsoft.com/office/powerpoint/2010/main" spd="slow">
+  <p:transition xmlns:p14="http://schemas.microsoft.com/office/powerpoint/2010/main" spd="slow" advClick="0">
     <p:fade thruBlk="1"/>
   </p:transition>
   <p:timing>
@@ -8221,11 +8329,11 @@
           <a:p>
             <a:r>
               <a:rPr lang="en-US" dirty="0" err="1" smtClean="0"/>
-              <a:t>lec</a:t>
+              <a:t>incexcI</a:t>
             </a:r>
             <a:r>
               <a:rPr lang="en-US" dirty="0" smtClean="0"/>
-              <a:t> 10F.</a:t>
+              <a:t>.</a:t>
             </a:r>
             <a:fld id="{D7ABDA0D-60F2-4808-A61D-5677EEC539B8}" type="slidenum">
               <a:rPr lang="en-US" smtClean="0"/>
@@ -8241,7 +8349,7 @@
   <p:clrMapOvr>
     <a:masterClrMapping/>
   </p:clrMapOvr>
-  <p:transition xmlns:p14="http://schemas.microsoft.com/office/powerpoint/2010/main" spd="med">
+  <p:transition xmlns:p14="http://schemas.microsoft.com/office/powerpoint/2010/main" spd="slow" advClick="0">
     <p:fade/>
   </p:transition>
   <p:timing>
@@ -8256,9 +8364,6 @@
                     <p:cTn id="3" fill="hold">
                       <p:stCondLst>
                         <p:cond delay="indefinite"/>
-                        <p:cond evt="onBegin" delay="0">
-                          <p:tn val="2"/>
-                        </p:cond>
                       </p:stCondLst>
                       <p:childTnLst>
                         <p:par>
@@ -8268,7 +8373,7 @@
                             </p:stCondLst>
                             <p:childTnLst>
                               <p:par>
-                                <p:cTn id="5" presetID="10" presetClass="entr" presetSubtype="0" fill="hold" nodeType="afterEffect">
+                                <p:cTn id="5" presetID="10" presetClass="entr" presetSubtype="0" fill="hold" grpId="0" nodeType="clickEffect">
                                   <p:stCondLst>
                                     <p:cond delay="0"/>
                                   </p:stCondLst>
@@ -8276,50 +8381,6 @@
                                     <p:set>
                                       <p:cBhvr>
                                         <p:cTn id="6" dur="1" fill="hold">
-                                          <p:stCondLst>
-                                            <p:cond delay="0"/>
-                                          </p:stCondLst>
-                                        </p:cTn>
-                                        <p:tgtEl>
-                                          <p:spTgt spid="15362"/>
-                                        </p:tgtEl>
-                                        <p:attrNameLst>
-                                          <p:attrName>style.visibility</p:attrName>
-                                        </p:attrNameLst>
-                                      </p:cBhvr>
-                                      <p:to>
-                                        <p:strVal val="visible"/>
-                                      </p:to>
-                                    </p:set>
-                                    <p:animEffect transition="in" filter="fade">
-                                      <p:cBhvr>
-                                        <p:cTn id="7" dur="500"/>
-                                        <p:tgtEl>
-                                          <p:spTgt spid="15362"/>
-                                        </p:tgtEl>
-                                      </p:cBhvr>
-                                    </p:animEffect>
-                                  </p:childTnLst>
-                                </p:cTn>
-                              </p:par>
-                            </p:childTnLst>
-                          </p:cTn>
-                        </p:par>
-                        <p:par>
-                          <p:cTn id="8" fill="hold">
-                            <p:stCondLst>
-                              <p:cond delay="500"/>
-                            </p:stCondLst>
-                            <p:childTnLst>
-                              <p:par>
-                                <p:cTn id="9" presetID="10" presetClass="entr" presetSubtype="0" fill="hold" grpId="0" nodeType="afterEffect">
-                                  <p:stCondLst>
-                                    <p:cond delay="0"/>
-                                  </p:stCondLst>
-                                  <p:childTnLst>
-                                    <p:set>
-                                      <p:cBhvr>
-                                        <p:cTn id="10" dur="1" fill="hold">
                                           <p:stCondLst>
                                             <p:cond delay="0"/>
                                           </p:stCondLst>
@@ -8341,13 +8402,57 @@
                                     </p:set>
                                     <p:animEffect transition="in" filter="fade">
                                       <p:cBhvr>
-                                        <p:cTn id="11" dur="500"/>
+                                        <p:cTn id="7" dur="500"/>
                                         <p:tgtEl>
                                           <p:spTgt spid="15365">
                                             <p:txEl>
                                               <p:pRg st="0" end="0"/>
                                             </p:txEl>
                                           </p:spTgt>
+                                        </p:tgtEl>
+                                      </p:cBhvr>
+                                    </p:animEffect>
+                                  </p:childTnLst>
+                                </p:cTn>
+                              </p:par>
+                            </p:childTnLst>
+                          </p:cTn>
+                        </p:par>
+                        <p:par>
+                          <p:cTn id="8" fill="hold">
+                            <p:stCondLst>
+                              <p:cond delay="500"/>
+                            </p:stCondLst>
+                            <p:childTnLst>
+                              <p:par>
+                                <p:cTn id="9" presetID="10" presetClass="entr" presetSubtype="0" fill="hold" nodeType="afterEffect">
+                                  <p:stCondLst>
+                                    <p:cond delay="0"/>
+                                  </p:stCondLst>
+                                  <p:childTnLst>
+                                    <p:set>
+                                      <p:cBhvr>
+                                        <p:cTn id="10" dur="1" fill="hold">
+                                          <p:stCondLst>
+                                            <p:cond delay="0"/>
+                                          </p:stCondLst>
+                                        </p:cTn>
+                                        <p:tgtEl>
+                                          <p:spTgt spid="15362"/>
+                                        </p:tgtEl>
+                                        <p:attrNameLst>
+                                          <p:attrName>style.visibility</p:attrName>
+                                        </p:attrNameLst>
+                                      </p:cBhvr>
+                                      <p:to>
+                                        <p:strVal val="visible"/>
+                                      </p:to>
+                                    </p:set>
+                                    <p:animEffect transition="in" filter="fade">
+                                      <p:cBhvr>
+                                        <p:cTn id="11" dur="500"/>
+                                        <p:tgtEl>
+                                          <p:spTgt spid="15362"/>
                                         </p:tgtEl>
                                       </p:cBhvr>
                                     </p:animEffect>
@@ -8452,7 +8557,7 @@
           <a:graphicData uri="http://schemas.openxmlformats.org/presentationml/2006/ole">
             <mc:AlternateContent xmlns:mc="http://schemas.openxmlformats.org/markup-compatibility/2006">
               <mc:Choice xmlns:v="urn:schemas-microsoft-com:vml" Requires="v">
-                <p:oleObj spid="_x0000_s1055" name="Equation" r:id="rId4" imgW="1790640" imgH="228600" progId="Equation.DSMT4">
+                <p:oleObj spid="_x0000_s1059" name="Equation" r:id="rId4" imgW="1790640" imgH="228600" progId="Equation.DSMT4">
                   <p:embed/>
                 </p:oleObj>
               </mc:Choice>
@@ -8741,71 +8846,6 @@
       </p:grpSp>
       <p:sp>
         <p:nvSpPr>
-          <p:cNvPr id="1030" name="Text Box 11"/>
-          <p:cNvSpPr txBox="1">
-            <a:spLocks noChangeArrowheads="1"/>
-          </p:cNvSpPr>
-          <p:nvPr/>
-        </p:nvSpPr>
-        <p:spPr bwMode="auto">
-          <a:xfrm>
-            <a:off x="990600" y="5334000"/>
-            <a:ext cx="7086600" cy="823913"/>
-          </a:xfrm>
-          <a:prstGeom prst="rect">
-            <a:avLst/>
-          </a:prstGeom>
-          <a:noFill/>
-          <a:ln w="9525">
-            <a:noFill/>
-            <a:miter lim="800000"/>
-            <a:headEnd/>
-            <a:tailEnd type="none" w="lg" len="lg"/>
-          </a:ln>
-        </p:spPr>
-        <p:txBody>
-          <a:bodyPr>
-            <a:spAutoFit/>
-          </a:bodyPr>
-          <a:lstStyle/>
-          <a:p>
-            <a:pPr lvl="1">
-              <a:spcBef>
-                <a:spcPct val="20000"/>
-              </a:spcBef>
-            </a:pPr>
-            <a:r>
-              <a:rPr lang="en-US" sz="4800">
-                <a:latin typeface="Comic Sans MS" pitchFamily="66" charset="0"/>
-              </a:rPr>
-              <a:t>What if</a:t>
-            </a:r>
-            <a:r>
-              <a:rPr lang="en-US" sz="4800" i="1">
-                <a:latin typeface="Comic Sans MS" pitchFamily="66" charset="0"/>
-              </a:rPr>
-              <a:t> </a:t>
-            </a:r>
-            <a:r>
-              <a:rPr lang="en-US" sz="4800">
-                <a:solidFill>
-                  <a:schemeClr val="accent2"/>
-                </a:solidFill>
-                <a:latin typeface="Comic Sans MS" pitchFamily="66" charset="0"/>
-              </a:rPr>
-              <a:t>not </a:t>
-            </a:r>
-            <a:r>
-              <a:rPr lang="en-US" sz="4800">
-                <a:latin typeface="Comic Sans MS" pitchFamily="66" charset="0"/>
-              </a:rPr>
-              <a:t>disjoint?</a:t>
-            </a:r>
-          </a:p>
-        </p:txBody>
-      </p:sp>
-      <p:sp>
-        <p:nvSpPr>
           <p:cNvPr id="1031" name="Slide Number Placeholder 12"/>
           <p:cNvSpPr>
             <a:spLocks noGrp="1"/>
@@ -8823,11 +8863,11 @@
           <a:p>
             <a:r>
               <a:rPr lang="en-US" dirty="0" err="1" smtClean="0"/>
-              <a:t>lec</a:t>
+              <a:t>incexcI</a:t>
             </a:r>
             <a:r>
               <a:rPr lang="en-US" dirty="0" smtClean="0"/>
-              <a:t> 10F.</a:t>
+              <a:t>.</a:t>
             </a:r>
             <a:fld id="{28279EDB-FC81-4FF0-A8B6-60CD38656473}" type="slidenum">
               <a:rPr lang="en-US" smtClean="0"/>
@@ -8843,7 +8883,7 @@
   <p:clrMapOvr>
     <a:masterClrMapping/>
   </p:clrMapOvr>
-  <p:transition xmlns:p14="http://schemas.microsoft.com/office/powerpoint/2010/main" advClick="0">
+  <p:transition xmlns:p14="http://schemas.microsoft.com/office/powerpoint/2010/main" spd="slow" advClick="0">
     <p:fade/>
   </p:transition>
   <p:timing>
@@ -9602,11 +9642,11 @@
           <a:p>
             <a:r>
               <a:rPr lang="en-US" dirty="0" err="1" smtClean="0"/>
-              <a:t>lec</a:t>
+              <a:t>incexcI</a:t>
             </a:r>
             <a:r>
               <a:rPr lang="en-US" dirty="0" smtClean="0"/>
-              <a:t> 10F.</a:t>
+              <a:t>.</a:t>
             </a:r>
             <a:fld id="{3B8E4082-F40B-4428-B587-3133F5D7165C}" type="slidenum">
               <a:rPr lang="en-US" smtClean="0"/>
@@ -9622,18 +9662,9 @@
   <p:clrMapOvr>
     <a:masterClrMapping/>
   </p:clrMapOvr>
-  <mc:AlternateContent xmlns:mc="http://schemas.openxmlformats.org/markup-compatibility/2006">
-    <mc:Choice xmlns:p14="http://schemas.microsoft.com/office/powerpoint/2010/main" Requires="p14">
-      <p:transition spd="med" p14:dur="700" advClick="0">
-        <p:fade/>
-      </p:transition>
-    </mc:Choice>
-    <mc:Fallback>
-      <p:transition xmlns:p14="http://schemas.microsoft.com/office/powerpoint/2010/main" spd="med" advClick="0">
-        <p:fade/>
-      </p:transition>
-    </mc:Fallback>
-  </mc:AlternateContent>
+  <p:transition xmlns:p14="http://schemas.microsoft.com/office/powerpoint/2010/main" spd="slow" advClick="0">
+    <p:fade thruBlk="1"/>
+  </p:transition>
   <p:timing>
     <p:tnLst>
       <p:par>
@@ -9724,7 +9755,7 @@
 </file>
 
 <file path=ppt/slides/slide6.xml><?xml version="1.0" encoding="utf-8"?>
-<p:sld xmlns:a="http://schemas.openxmlformats.org/drawingml/2006/main" xmlns:r="http://schemas.openxmlformats.org/officeDocument/2006/relationships" xmlns:p="http://schemas.openxmlformats.org/presentationml/2006/main">
+<p:sld xmlns:a="http://schemas.openxmlformats.org/drawingml/2006/main" xmlns:r="http://schemas.openxmlformats.org/officeDocument/2006/relationships" xmlns:p="http://schemas.openxmlformats.org/presentationml/2006/main" show="0">
   <p:cSld>
     <p:spTree>
       <p:nvGrpSpPr>
@@ -9796,11 +9827,11 @@
           <a:p>
             <a:r>
               <a:rPr lang="en-US" dirty="0" err="1" smtClean="0"/>
-              <a:t>lec</a:t>
+              <a:t>incexcI</a:t>
             </a:r>
             <a:r>
               <a:rPr lang="en-US" dirty="0" smtClean="0"/>
-              <a:t> 10F.</a:t>
+              <a:t>.</a:t>
             </a:r>
             <a:fld id="{440333D2-3154-4D4B-AAB9-AB5679BA8A30}" type="slidenum">
               <a:rPr lang="en-US" smtClean="0"/>
@@ -9820,25 +9851,25 @@
           <p:nvPr>
             <p:extLst>
               <p:ext uri="{D42A27DB-BD31-4B8C-83A1-F6EECF244321}">
-                <p14:modId xmlns:p14="http://schemas.microsoft.com/office/powerpoint/2010/main" val="663978512"/>
+                <p14:modId xmlns:p14="http://schemas.microsoft.com/office/powerpoint/2010/main" val="3034928959"/>
               </p:ext>
             </p:extLst>
           </p:nvPr>
         </p:nvGraphicFramePr>
         <p:xfrm>
-          <a:off x="304800" y="3200400"/>
-          <a:ext cx="8534400" cy="2133600"/>
+          <a:off x="457200" y="3200400"/>
+          <a:ext cx="8229600" cy="2133600"/>
         </p:xfrm>
         <a:graphic>
           <a:graphicData uri="http://schemas.openxmlformats.org/presentationml/2006/ole">
             <mc:AlternateContent xmlns:mc="http://schemas.openxmlformats.org/markup-compatibility/2006">
               <mc:Choice xmlns:v="urn:schemas-microsoft-com:vml" Requires="v">
-                <p:oleObj spid="_x0000_s201755" name="Equation" r:id="rId4" imgW="2133600" imgH="533400" progId="Equation.DSMT4">
+                <p:oleObj spid="_x0000_s201762" name="Equation" r:id="rId4" imgW="2057400" imgH="533400" progId="Equation.DSMT4">
                   <p:embed/>
                 </p:oleObj>
               </mc:Choice>
               <mc:Fallback>
-                <p:oleObj name="Equation" r:id="rId4" imgW="2133600" imgH="533400" progId="Equation.DSMT4">
+                <p:oleObj name="Equation" r:id="rId4" imgW="2057400" imgH="533400" progId="Equation.DSMT4">
                   <p:embed/>
                   <p:pic>
                     <p:nvPicPr>
@@ -9854,8 +9885,8 @@
                     </p:blipFill>
                     <p:spPr>
                       <a:xfrm>
-                        <a:off x="304800" y="3200400"/>
-                        <a:ext cx="8534400" cy="2133600"/>
+                        <a:off x="457200" y="3200400"/>
+                        <a:ext cx="8229600" cy="2133600"/>
                       </a:xfrm>
                       <a:prstGeom prst="rect">
                         <a:avLst/>
@@ -9890,7 +9921,7 @@
           <a:graphicData uri="http://schemas.openxmlformats.org/presentationml/2006/ole">
             <mc:AlternateContent xmlns:mc="http://schemas.openxmlformats.org/markup-compatibility/2006">
               <mc:Choice xmlns:v="urn:schemas-microsoft-com:vml" Requires="v">
-                <p:oleObj spid="_x0000_s201756" name="Equation" r:id="rId6" imgW="1346200" imgH="266700" progId="Equation.DSMT4">
+                <p:oleObj spid="_x0000_s201763" name="Equation" r:id="rId6" imgW="1346200" imgH="266700" progId="Equation.DSMT4">
                   <p:embed/>
                 </p:oleObj>
               </mc:Choice>
@@ -9949,7 +9980,7 @@
     <a:masterClrMapping/>
   </p:clrMapOvr>
   <p:transition xmlns:p14="http://schemas.microsoft.com/office/powerpoint/2010/main" spd="slow" advClick="0">
-    <p:fade thruBlk="1"/>
+    <p:fade/>
   </p:transition>
   <p:timing>
     <p:tnLst>
@@ -10000,7 +10031,7 @@
           <a:graphicData uri="http://schemas.openxmlformats.org/presentationml/2006/ole">
             <mc:AlternateContent xmlns:mc="http://schemas.openxmlformats.org/markup-compatibility/2006">
               <mc:Choice xmlns:v="urn:schemas-microsoft-com:vml" Requires="v">
-                <p:oleObj spid="_x0000_s5178" name="Equation" r:id="rId4" imgW="1346200" imgH="266700" progId="Equation.DSMT4">
+                <p:oleObj spid="_x0000_s5185" name="Equation" r:id="rId4" imgW="1346200" imgH="266700" progId="Equation.DSMT4">
                   <p:embed/>
                 </p:oleObj>
               </mc:Choice>
@@ -10070,7 +10101,7 @@
           <a:graphicData uri="http://schemas.openxmlformats.org/presentationml/2006/ole">
             <mc:AlternateContent xmlns:mc="http://schemas.openxmlformats.org/markup-compatibility/2006">
               <mc:Choice xmlns:v="urn:schemas-microsoft-com:vml" Requires="v">
-                <p:oleObj spid="_x0000_s5179" name="Equation" r:id="rId6" imgW="1447800" imgH="495300" progId="Equation.DSMT4">
+                <p:oleObj spid="_x0000_s5186" name="Equation" r:id="rId6" imgW="1447800" imgH="495300" progId="Equation.DSMT4">
                   <p:embed/>
                 </p:oleObj>
               </mc:Choice>
@@ -10167,11 +10198,11 @@
           <a:p>
             <a:r>
               <a:rPr lang="en-US" dirty="0" err="1" smtClean="0"/>
-              <a:t>lec</a:t>
+              <a:t>incexcI</a:t>
             </a:r>
             <a:r>
               <a:rPr lang="en-US" dirty="0" smtClean="0"/>
-              <a:t> 10F.</a:t>
+              <a:t>.</a:t>
             </a:r>
             <a:fld id="{440333D2-3154-4D4B-AAB9-AB5679BA8A30}" type="slidenum">
               <a:rPr lang="en-US" smtClean="0"/>
@@ -10187,18 +10218,9 @@
   <p:clrMapOvr>
     <a:masterClrMapping/>
   </p:clrMapOvr>
-  <mc:AlternateContent xmlns:mc="http://schemas.openxmlformats.org/markup-compatibility/2006">
-    <mc:Choice xmlns:p14="http://schemas.microsoft.com/office/powerpoint/2010/main" Requires="p14">
-      <p:transition spd="med" p14:dur="700" advClick="0">
-        <p:fade/>
-      </p:transition>
-    </mc:Choice>
-    <mc:Fallback>
-      <p:transition xmlns:p14="http://schemas.microsoft.com/office/powerpoint/2010/main" spd="med" advClick="0">
-        <p:fade/>
-      </p:transition>
-    </mc:Fallback>
-  </mc:AlternateContent>
+  <p:transition xmlns:p14="http://schemas.microsoft.com/office/powerpoint/2010/main" spd="slow" advClick="0">
+    <p:fade/>
+  </p:transition>
   <p:timing>
     <p:tnLst>
       <p:par>
@@ -10324,7 +10346,7 @@
           <a:graphicData uri="http://schemas.openxmlformats.org/presentationml/2006/ole">
             <mc:AlternateContent xmlns:mc="http://schemas.openxmlformats.org/markup-compatibility/2006">
               <mc:Choice xmlns:v="urn:schemas-microsoft-com:vml" Requires="v">
-                <p:oleObj spid="_x0000_s198710" name="Equation" r:id="rId4" imgW="622300" imgH="495300" progId="Equation.DSMT4">
+                <p:oleObj spid="_x0000_s198717" name="Equation" r:id="rId4" imgW="622300" imgH="495300" progId="Equation.DSMT4">
                   <p:embed/>
                 </p:oleObj>
               </mc:Choice>
@@ -10428,11 +10450,11 @@
           <a:p>
             <a:r>
               <a:rPr lang="en-US" dirty="0" err="1" smtClean="0"/>
-              <a:t>lec</a:t>
+              <a:t>incexcI</a:t>
             </a:r>
             <a:r>
               <a:rPr lang="en-US" dirty="0" smtClean="0"/>
-              <a:t> 10F.</a:t>
+              <a:t>.</a:t>
             </a:r>
             <a:fld id="{440333D2-3154-4D4B-AAB9-AB5679BA8A30}" type="slidenum">
               <a:rPr lang="en-US" smtClean="0"/>
@@ -10465,7 +10487,7 @@
           <a:graphicData uri="http://schemas.openxmlformats.org/presentationml/2006/ole">
             <mc:AlternateContent xmlns:mc="http://schemas.openxmlformats.org/markup-compatibility/2006">
               <mc:Choice xmlns:v="urn:schemas-microsoft-com:vml" Requires="v">
-                <p:oleObj spid="_x0000_s198711" name="Equation" r:id="rId6" imgW="2133600" imgH="533400" progId="Equation.DSMT4">
+                <p:oleObj spid="_x0000_s198718" name="Equation" r:id="rId6" imgW="2133600" imgH="533400" progId="Equation.DSMT4">
                   <p:embed/>
                 </p:oleObj>
               </mc:Choice>
@@ -10505,8 +10527,8 @@
   <p:clrMapOvr>
     <a:masterClrMapping/>
   </p:clrMapOvr>
-  <p:transition xmlns:p14="http://schemas.microsoft.com/office/powerpoint/2010/main" spd="slow">
-    <p:fade thruBlk="1"/>
+  <p:transition xmlns:p14="http://schemas.microsoft.com/office/powerpoint/2010/main" spd="slow" advClick="0">
+    <p:fade/>
   </p:transition>
   <p:timing>
     <p:tnLst>
@@ -10557,7 +10579,7 @@
           <a:graphicData uri="http://schemas.openxmlformats.org/presentationml/2006/ole">
             <mc:AlternateContent xmlns:mc="http://schemas.openxmlformats.org/markup-compatibility/2006">
               <mc:Choice xmlns:v="urn:schemas-microsoft-com:vml" Requires="v">
-                <p:oleObj spid="_x0000_s200731" name="Equation" r:id="rId4" imgW="622300" imgH="495300" progId="Equation.DSMT4">
+                <p:oleObj spid="_x0000_s200738" name="Equation" r:id="rId4" imgW="622300" imgH="495300" progId="Equation.DSMT4">
                   <p:embed/>
                 </p:oleObj>
               </mc:Choice>
@@ -10627,7 +10649,7 @@
           <a:graphicData uri="http://schemas.openxmlformats.org/presentationml/2006/ole">
             <mc:AlternateContent xmlns:mc="http://schemas.openxmlformats.org/markup-compatibility/2006">
               <mc:Choice xmlns:v="urn:schemas-microsoft-com:vml" Requires="v">
-                <p:oleObj spid="_x0000_s200732" name="Equation" r:id="rId6" imgW="1295400" imgH="495300" progId="Equation.DSMT4">
+                <p:oleObj spid="_x0000_s200739" name="Equation" r:id="rId6" imgW="1295400" imgH="495300" progId="Equation.DSMT4">
                   <p:embed/>
                 </p:oleObj>
               </mc:Choice>
@@ -10731,11 +10753,11 @@
           <a:p>
             <a:r>
               <a:rPr lang="en-US" dirty="0" err="1" smtClean="0"/>
-              <a:t>lec</a:t>
+              <a:t>incexcI</a:t>
             </a:r>
             <a:r>
               <a:rPr lang="en-US" dirty="0" smtClean="0"/>
-              <a:t> 10F.</a:t>
+              <a:t>.</a:t>
             </a:r>
             <a:fld id="{440333D2-3154-4D4B-AAB9-AB5679BA8A30}" type="slidenum">
               <a:rPr lang="en-US" smtClean="0"/>
@@ -10756,7 +10778,7 @@
   <p:clrMapOvr>
     <a:masterClrMapping/>
   </p:clrMapOvr>
-  <p:transition xmlns:p14="http://schemas.microsoft.com/office/powerpoint/2010/main" spd="slow">
+  <p:transition xmlns:p14="http://schemas.microsoft.com/office/powerpoint/2010/main" spd="slow" advClick="0">
     <p:fade/>
   </p:transition>
   <p:timing>

</xml_diff>